<commit_message>
changed camera issue image
</commit_message>
<xml_diff>
--- a/assets/setup/camera_issue.pptx
+++ b/assets/setup/camera_issue.pptx
@@ -104,6 +104,11 @@
       </a:defRPr>
     </a:lvl9pPr>
   </p:defaultTextStyle>
+  <p:extLst>
+    <p:ext uri="{EFAFB233-063F-42B5-8137-9DF3F51BA10A}">
+      <p15:sldGuideLst xmlns:p15="http://schemas.microsoft.com/office/powerpoint/2012/main"/>
+    </p:ext>
+  </p:extLst>
 </p:presentation>
 </file>
 
@@ -3372,7 +3377,7 @@
         <p:spPr>
           <a:xfrm>
             <a:off x="5014669" y="239320"/>
-            <a:ext cx="2289409" cy="584775"/>
+            <a:ext cx="2266967" cy="584775"/>
           </a:xfrm>
           <a:prstGeom prst="rect">
             <a:avLst/>
@@ -3391,7 +3396,7 @@
                   <a:schemeClr val="bg1"/>
                 </a:solidFill>
               </a:rPr>
-              <a:t>Real object</a:t>
+              <a:t>Real Scene</a:t>
             </a:r>
           </a:p>
         </p:txBody>
@@ -3411,7 +3416,7 @@
         <p:spPr>
           <a:xfrm>
             <a:off x="6818311" y="987329"/>
-            <a:ext cx="2594749" cy="584775"/>
+            <a:ext cx="2646045" cy="584775"/>
           </a:xfrm>
           <a:prstGeom prst="rect">
             <a:avLst/>
@@ -3430,7 +3435,7 @@
                   <a:schemeClr val="bg1"/>
                 </a:solidFill>
               </a:rPr>
-              <a:t>Camera view</a:t>
+              <a:t>Camera View</a:t>
             </a:r>
           </a:p>
         </p:txBody>

</xml_diff>